<commit_message>
tipos de datos finalizado
</commit_message>
<xml_diff>
--- a/1-Tipos de Datos.pptx
+++ b/1-Tipos de Datos.pptx
@@ -21,6 +21,9 @@
     <p:sldId id="269" r:id="rId15"/>
     <p:sldId id="270" r:id="rId16"/>
     <p:sldId id="271" r:id="rId17"/>
+    <p:sldId id="273" r:id="rId18"/>
+    <p:sldId id="274" r:id="rId19"/>
+    <p:sldId id="275" r:id="rId20"/>
   </p:sldIdLst>
   <p:sldSz cx="12192000" cy="6858000"/>
   <p:notesSz cx="6858000" cy="9144000"/>
@@ -177,7 +180,7 @@
           <a:noFill/>
           <a:extLst>
             <a:ext uri="{909E8E84-426E-40dd-AFC4-6F175D3DCCD1}">
-              <a14:hiddenFill xmlns="" xmlns:a14="http://schemas.microsoft.com/office/drawing/2010/main">
+              <a14:hiddenFill xmlns:a14="http://schemas.microsoft.com/office/drawing/2010/main" xmlns="">
                 <a:solidFill>
                   <a:srgbClr val="FFFFFF"/>
                 </a:solidFill>
@@ -237,7 +240,7 @@
             </a:ln>
             <a:extLst>
               <a:ext uri="{91240B29-F687-4f45-9708-019B960494DF}">
-                <a14:hiddenLine xmlns="" xmlns:a14="http://schemas.microsoft.com/office/drawing/2010/main" w="9525">
+                <a14:hiddenLine xmlns:a14="http://schemas.microsoft.com/office/drawing/2010/main" xmlns="" w="9525">
                   <a:solidFill>
                     <a:srgbClr val="000000"/>
                   </a:solidFill>
@@ -327,7 +330,7 @@
             </a:ln>
             <a:extLst>
               <a:ext uri="{91240B29-F687-4f45-9708-019B960494DF}">
-                <a14:hiddenLine xmlns="" xmlns:a14="http://schemas.microsoft.com/office/drawing/2010/main" w="9525">
+                <a14:hiddenLine xmlns:a14="http://schemas.microsoft.com/office/drawing/2010/main" xmlns="" w="9525">
                   <a:solidFill>
                     <a:srgbClr val="000000"/>
                   </a:solidFill>
@@ -417,7 +420,7 @@
             </a:ln>
             <a:extLst>
               <a:ext uri="{91240B29-F687-4f45-9708-019B960494DF}">
-                <a14:hiddenLine xmlns="" xmlns:a14="http://schemas.microsoft.com/office/drawing/2010/main" w="9525">
+                <a14:hiddenLine xmlns:a14="http://schemas.microsoft.com/office/drawing/2010/main" xmlns="" w="9525">
                   <a:solidFill>
                     <a:srgbClr val="000000"/>
                   </a:solidFill>
@@ -451,7 +454,7 @@
             </a:ln>
             <a:extLst>
               <a:ext uri="{91240B29-F687-4f45-9708-019B960494DF}">
-                <a14:hiddenLine xmlns="" xmlns:a14="http://schemas.microsoft.com/office/drawing/2010/main" w="9525">
+                <a14:hiddenLine xmlns:a14="http://schemas.microsoft.com/office/drawing/2010/main" xmlns="" w="9525">
                   <a:solidFill>
                     <a:srgbClr val="000000"/>
                   </a:solidFill>
@@ -541,7 +544,7 @@
             </a:ln>
             <a:extLst>
               <a:ext uri="{91240B29-F687-4f45-9708-019B960494DF}">
-                <a14:hiddenLine xmlns="" xmlns:a14="http://schemas.microsoft.com/office/drawing/2010/main" w="9525">
+                <a14:hiddenLine xmlns:a14="http://schemas.microsoft.com/office/drawing/2010/main" xmlns="" w="9525">
                   <a:solidFill>
                     <a:srgbClr val="000000"/>
                   </a:solidFill>
@@ -603,7 +606,7 @@
             </a:ln>
             <a:extLst>
               <a:ext uri="{91240B29-F687-4f45-9708-019B960494DF}">
-                <a14:hiddenLine xmlns="" xmlns:a14="http://schemas.microsoft.com/office/drawing/2010/main" w="9525">
+                <a14:hiddenLine xmlns:a14="http://schemas.microsoft.com/office/drawing/2010/main" xmlns="" w="9525">
                   <a:solidFill>
                     <a:srgbClr val="000000"/>
                   </a:solidFill>
@@ -665,7 +668,7 @@
             </a:ln>
             <a:extLst>
               <a:ext uri="{91240B29-F687-4f45-9708-019B960494DF}">
-                <a14:hiddenLine xmlns="" xmlns:a14="http://schemas.microsoft.com/office/drawing/2010/main" w="9525">
+                <a14:hiddenLine xmlns:a14="http://schemas.microsoft.com/office/drawing/2010/main" xmlns="" w="9525">
                   <a:solidFill>
                     <a:srgbClr val="000000"/>
                   </a:solidFill>
@@ -755,7 +758,7 @@
             </a:ln>
             <a:extLst>
               <a:ext uri="{91240B29-F687-4f45-9708-019B960494DF}">
-                <a14:hiddenLine xmlns="" xmlns:a14="http://schemas.microsoft.com/office/drawing/2010/main" w="9525">
+                <a14:hiddenLine xmlns:a14="http://schemas.microsoft.com/office/drawing/2010/main" xmlns="" w="9525">
                   <a:solidFill>
                     <a:srgbClr val="000000"/>
                   </a:solidFill>
@@ -817,7 +820,7 @@
             </a:ln>
             <a:extLst>
               <a:ext uri="{91240B29-F687-4f45-9708-019B960494DF}">
-                <a14:hiddenLine xmlns="" xmlns:a14="http://schemas.microsoft.com/office/drawing/2010/main" w="9525">
+                <a14:hiddenLine xmlns:a14="http://schemas.microsoft.com/office/drawing/2010/main" xmlns="" w="9525">
                   <a:solidFill>
                     <a:srgbClr val="000000"/>
                   </a:solidFill>
@@ -879,7 +882,7 @@
             </a:ln>
             <a:extLst>
               <a:ext uri="{91240B29-F687-4f45-9708-019B960494DF}">
-                <a14:hiddenLine xmlns="" xmlns:a14="http://schemas.microsoft.com/office/drawing/2010/main" w="9525">
+                <a14:hiddenLine xmlns:a14="http://schemas.microsoft.com/office/drawing/2010/main" xmlns="" w="9525">
                   <a:solidFill>
                     <a:srgbClr val="000000"/>
                   </a:solidFill>
@@ -969,7 +972,7 @@
             </a:ln>
             <a:extLst>
               <a:ext uri="{91240B29-F687-4f45-9708-019B960494DF}">
-                <a14:hiddenLine xmlns="" xmlns:a14="http://schemas.microsoft.com/office/drawing/2010/main" w="9525">
+                <a14:hiddenLine xmlns:a14="http://schemas.microsoft.com/office/drawing/2010/main" xmlns="" w="9525">
                   <a:solidFill>
                     <a:srgbClr val="000000"/>
                   </a:solidFill>
@@ -1059,7 +1062,7 @@
             </a:ln>
             <a:extLst>
               <a:ext uri="{91240B29-F687-4f45-9708-019B960494DF}">
-                <a14:hiddenLine xmlns="" xmlns:a14="http://schemas.microsoft.com/office/drawing/2010/main" w="9525">
+                <a14:hiddenLine xmlns:a14="http://schemas.microsoft.com/office/drawing/2010/main" xmlns="" w="9525">
                   <a:solidFill>
                     <a:srgbClr val="000000"/>
                   </a:solidFill>
@@ -1121,7 +1124,7 @@
             </a:ln>
             <a:extLst>
               <a:ext uri="{91240B29-F687-4f45-9708-019B960494DF}">
-                <a14:hiddenLine xmlns="" xmlns:a14="http://schemas.microsoft.com/office/drawing/2010/main" w="9525">
+                <a14:hiddenLine xmlns:a14="http://schemas.microsoft.com/office/drawing/2010/main" xmlns="" w="9525">
                   <a:solidFill>
                     <a:srgbClr val="000000"/>
                   </a:solidFill>
@@ -1231,7 +1234,7 @@
             </a:ln>
             <a:extLst>
               <a:ext uri="{91240B29-F687-4f45-9708-019B960494DF}">
-                <a14:hiddenLine xmlns="" xmlns:a14="http://schemas.microsoft.com/office/drawing/2010/main" w="9525">
+                <a14:hiddenLine xmlns:a14="http://schemas.microsoft.com/office/drawing/2010/main" xmlns="" w="9525">
                   <a:solidFill>
                     <a:srgbClr val="000000"/>
                   </a:solidFill>
@@ -1293,7 +1296,7 @@
             </a:ln>
             <a:extLst>
               <a:ext uri="{91240B29-F687-4f45-9708-019B960494DF}">
-                <a14:hiddenLine xmlns="" xmlns:a14="http://schemas.microsoft.com/office/drawing/2010/main" w="9525">
+                <a14:hiddenLine xmlns:a14="http://schemas.microsoft.com/office/drawing/2010/main" xmlns="" w="9525">
                   <a:solidFill>
                     <a:srgbClr val="000000"/>
                   </a:solidFill>
@@ -1383,7 +1386,7 @@
             </a:ln>
             <a:extLst>
               <a:ext uri="{91240B29-F687-4f45-9708-019B960494DF}">
-                <a14:hiddenLine xmlns="" xmlns:a14="http://schemas.microsoft.com/office/drawing/2010/main" w="9525">
+                <a14:hiddenLine xmlns:a14="http://schemas.microsoft.com/office/drawing/2010/main" xmlns="" w="9525">
                   <a:solidFill>
                     <a:srgbClr val="000000"/>
                   </a:solidFill>
@@ -1473,7 +1476,7 @@
             </a:ln>
             <a:extLst>
               <a:ext uri="{91240B29-F687-4f45-9708-019B960494DF}">
-                <a14:hiddenLine xmlns="" xmlns:a14="http://schemas.microsoft.com/office/drawing/2010/main" w="9525">
+                <a14:hiddenLine xmlns:a14="http://schemas.microsoft.com/office/drawing/2010/main" xmlns="" w="9525">
                   <a:solidFill>
                     <a:srgbClr val="000000"/>
                   </a:solidFill>
@@ -1535,7 +1538,7 @@
             </a:ln>
             <a:extLst>
               <a:ext uri="{91240B29-F687-4f45-9708-019B960494DF}">
-                <a14:hiddenLine xmlns="" xmlns:a14="http://schemas.microsoft.com/office/drawing/2010/main" w="9525">
+                <a14:hiddenLine xmlns:a14="http://schemas.microsoft.com/office/drawing/2010/main" xmlns="" w="9525">
                   <a:solidFill>
                     <a:srgbClr val="000000"/>
                   </a:solidFill>
@@ -1625,7 +1628,7 @@
             </a:ln>
             <a:extLst>
               <a:ext uri="{91240B29-F687-4f45-9708-019B960494DF}">
-                <a14:hiddenLine xmlns="" xmlns:a14="http://schemas.microsoft.com/office/drawing/2010/main" w="9525">
+                <a14:hiddenLine xmlns:a14="http://schemas.microsoft.com/office/drawing/2010/main" xmlns="" w="9525">
                   <a:solidFill>
                     <a:srgbClr val="000000"/>
                   </a:solidFill>
@@ -1715,7 +1718,7 @@
             </a:ln>
             <a:extLst>
               <a:ext uri="{91240B29-F687-4f45-9708-019B960494DF}">
-                <a14:hiddenLine xmlns="" xmlns:a14="http://schemas.microsoft.com/office/drawing/2010/main" w="9525">
+                <a14:hiddenLine xmlns:a14="http://schemas.microsoft.com/office/drawing/2010/main" xmlns="" w="9525">
                   <a:solidFill>
                     <a:srgbClr val="000000"/>
                   </a:solidFill>
@@ -1771,7 +1774,7 @@
             </a:ln>
             <a:extLst>
               <a:ext uri="{91240B29-F687-4f45-9708-019B960494DF}">
-                <a14:hiddenLine xmlns="" xmlns:a14="http://schemas.microsoft.com/office/drawing/2010/main" w="9525">
+                <a14:hiddenLine xmlns:a14="http://schemas.microsoft.com/office/drawing/2010/main" xmlns="" w="9525">
                   <a:solidFill>
                     <a:srgbClr val="000000"/>
                   </a:solidFill>
@@ -1861,7 +1864,7 @@
             </a:ln>
             <a:extLst>
               <a:ext uri="{91240B29-F687-4f45-9708-019B960494DF}">
-                <a14:hiddenLine xmlns="" xmlns:a14="http://schemas.microsoft.com/office/drawing/2010/main" w="9525">
+                <a14:hiddenLine xmlns:a14="http://schemas.microsoft.com/office/drawing/2010/main" xmlns="" w="9525">
                   <a:solidFill>
                     <a:srgbClr val="000000"/>
                   </a:solidFill>
@@ -1917,7 +1920,7 @@
             </a:ln>
             <a:extLst>
               <a:ext uri="{91240B29-F687-4f45-9708-019B960494DF}">
-                <a14:hiddenLine xmlns="" xmlns:a14="http://schemas.microsoft.com/office/drawing/2010/main" w="9525">
+                <a14:hiddenLine xmlns:a14="http://schemas.microsoft.com/office/drawing/2010/main" xmlns="" w="9525">
                   <a:solidFill>
                     <a:srgbClr val="000000"/>
                   </a:solidFill>
@@ -2007,7 +2010,7 @@
             </a:ln>
             <a:extLst>
               <a:ext uri="{91240B29-F687-4f45-9708-019B960494DF}">
-                <a14:hiddenLine xmlns="" xmlns:a14="http://schemas.microsoft.com/office/drawing/2010/main" w="9525">
+                <a14:hiddenLine xmlns:a14="http://schemas.microsoft.com/office/drawing/2010/main" xmlns="" w="9525">
                   <a:solidFill>
                     <a:srgbClr val="000000"/>
                   </a:solidFill>
@@ -2075,7 +2078,7 @@
             </a:ln>
             <a:extLst>
               <a:ext uri="{91240B29-F687-4f45-9708-019B960494DF}">
-                <a14:hiddenLine xmlns="" xmlns:a14="http://schemas.microsoft.com/office/drawing/2010/main" w="9525">
+                <a14:hiddenLine xmlns:a14="http://schemas.microsoft.com/office/drawing/2010/main" xmlns="" w="9525">
                   <a:solidFill>
                     <a:srgbClr val="000000"/>
                   </a:solidFill>
@@ -2165,7 +2168,7 @@
             </a:ln>
             <a:extLst>
               <a:ext uri="{91240B29-F687-4f45-9708-019B960494DF}">
-                <a14:hiddenLine xmlns="" xmlns:a14="http://schemas.microsoft.com/office/drawing/2010/main" w="9525">
+                <a14:hiddenLine xmlns:a14="http://schemas.microsoft.com/office/drawing/2010/main" xmlns="" w="9525">
                   <a:solidFill>
                     <a:srgbClr val="000000"/>
                   </a:solidFill>
@@ -2233,7 +2236,7 @@
             </a:ln>
             <a:extLst>
               <a:ext uri="{91240B29-F687-4f45-9708-019B960494DF}">
-                <a14:hiddenLine xmlns="" xmlns:a14="http://schemas.microsoft.com/office/drawing/2010/main" w="9525">
+                <a14:hiddenLine xmlns:a14="http://schemas.microsoft.com/office/drawing/2010/main" xmlns="" w="9525">
                   <a:solidFill>
                     <a:srgbClr val="000000"/>
                   </a:solidFill>
@@ -2323,7 +2326,7 @@
             </a:ln>
             <a:extLst>
               <a:ext uri="{91240B29-F687-4f45-9708-019B960494DF}">
-                <a14:hiddenLine xmlns="" xmlns:a14="http://schemas.microsoft.com/office/drawing/2010/main" w="9525">
+                <a14:hiddenLine xmlns:a14="http://schemas.microsoft.com/office/drawing/2010/main" xmlns="" w="9525">
                   <a:solidFill>
                     <a:srgbClr val="000000"/>
                   </a:solidFill>
@@ -2357,7 +2360,7 @@
             </a:ln>
             <a:extLst>
               <a:ext uri="{91240B29-F687-4f45-9708-019B960494DF}">
-                <a14:hiddenLine xmlns="" xmlns:a14="http://schemas.microsoft.com/office/drawing/2010/main" w="9525">
+                <a14:hiddenLine xmlns:a14="http://schemas.microsoft.com/office/drawing/2010/main" xmlns="" w="9525">
                   <a:solidFill>
                     <a:srgbClr val="000000"/>
                   </a:solidFill>
@@ -2447,7 +2450,7 @@
             </a:ln>
             <a:extLst>
               <a:ext uri="{91240B29-F687-4f45-9708-019B960494DF}">
-                <a14:hiddenLine xmlns="" xmlns:a14="http://schemas.microsoft.com/office/drawing/2010/main" w="9525">
+                <a14:hiddenLine xmlns:a14="http://schemas.microsoft.com/office/drawing/2010/main" xmlns="" w="9525">
                   <a:solidFill>
                     <a:srgbClr val="000000"/>
                   </a:solidFill>
@@ -2509,7 +2512,7 @@
             </a:ln>
             <a:extLst>
               <a:ext uri="{91240B29-F687-4f45-9708-019B960494DF}">
-                <a14:hiddenLine xmlns="" xmlns:a14="http://schemas.microsoft.com/office/drawing/2010/main" w="9525">
+                <a14:hiddenLine xmlns:a14="http://schemas.microsoft.com/office/drawing/2010/main" xmlns="" w="9525">
                   <a:solidFill>
                     <a:srgbClr val="000000"/>
                   </a:solidFill>
@@ -2571,7 +2574,7 @@
             </a:ln>
             <a:extLst>
               <a:ext uri="{91240B29-F687-4f45-9708-019B960494DF}">
-                <a14:hiddenLine xmlns="" xmlns:a14="http://schemas.microsoft.com/office/drawing/2010/main" w="9525">
+                <a14:hiddenLine xmlns:a14="http://schemas.microsoft.com/office/drawing/2010/main" xmlns="" w="9525">
                   <a:solidFill>
                     <a:srgbClr val="000000"/>
                   </a:solidFill>
@@ -2661,7 +2664,7 @@
             </a:ln>
             <a:extLst>
               <a:ext uri="{91240B29-F687-4f45-9708-019B960494DF}">
-                <a14:hiddenLine xmlns="" xmlns:a14="http://schemas.microsoft.com/office/drawing/2010/main" w="9525">
+                <a14:hiddenLine xmlns:a14="http://schemas.microsoft.com/office/drawing/2010/main" xmlns="" w="9525">
                   <a:solidFill>
                     <a:srgbClr val="000000"/>
                   </a:solidFill>
@@ -2729,7 +2732,7 @@
             </a:ln>
             <a:extLst>
               <a:ext uri="{91240B29-F687-4f45-9708-019B960494DF}">
-                <a14:hiddenLine xmlns="" xmlns:a14="http://schemas.microsoft.com/office/drawing/2010/main" w="9525">
+                <a14:hiddenLine xmlns:a14="http://schemas.microsoft.com/office/drawing/2010/main" xmlns="" w="9525">
                   <a:solidFill>
                     <a:srgbClr val="000000"/>
                   </a:solidFill>
@@ -2791,7 +2794,7 @@
             </a:ln>
             <a:extLst>
               <a:ext uri="{91240B29-F687-4f45-9708-019B960494DF}">
-                <a14:hiddenLine xmlns="" xmlns:a14="http://schemas.microsoft.com/office/drawing/2010/main" w="9525">
+                <a14:hiddenLine xmlns:a14="http://schemas.microsoft.com/office/drawing/2010/main" xmlns="" w="9525">
                   <a:solidFill>
                     <a:srgbClr val="000000"/>
                   </a:solidFill>
@@ -2881,7 +2884,7 @@
             </a:ln>
             <a:extLst>
               <a:ext uri="{91240B29-F687-4f45-9708-019B960494DF}">
-                <a14:hiddenLine xmlns="" xmlns:a14="http://schemas.microsoft.com/office/drawing/2010/main" w="9525">
+                <a14:hiddenLine xmlns:a14="http://schemas.microsoft.com/office/drawing/2010/main" xmlns="" w="9525">
                   <a:solidFill>
                     <a:srgbClr val="000000"/>
                   </a:solidFill>
@@ -2943,7 +2946,7 @@
             </a:ln>
             <a:extLst>
               <a:ext uri="{91240B29-F687-4f45-9708-019B960494DF}">
-                <a14:hiddenLine xmlns="" xmlns:a14="http://schemas.microsoft.com/office/drawing/2010/main" w="9525">
+                <a14:hiddenLine xmlns:a14="http://schemas.microsoft.com/office/drawing/2010/main" xmlns="" w="9525">
                   <a:solidFill>
                     <a:srgbClr val="000000"/>
                   </a:solidFill>
@@ -3033,7 +3036,7 @@
             </a:ln>
             <a:extLst>
               <a:ext uri="{91240B29-F687-4f45-9708-019B960494DF}">
-                <a14:hiddenLine xmlns="" xmlns:a14="http://schemas.microsoft.com/office/drawing/2010/main" w="9525">
+                <a14:hiddenLine xmlns:a14="http://schemas.microsoft.com/office/drawing/2010/main" xmlns="" w="9525">
                   <a:solidFill>
                     <a:srgbClr val="000000"/>
                   </a:solidFill>
@@ -3095,7 +3098,7 @@
             </a:ln>
             <a:extLst>
               <a:ext uri="{91240B29-F687-4f45-9708-019B960494DF}">
-                <a14:hiddenLine xmlns="" xmlns:a14="http://schemas.microsoft.com/office/drawing/2010/main" w="9525">
+                <a14:hiddenLine xmlns:a14="http://schemas.microsoft.com/office/drawing/2010/main" xmlns="" w="9525">
                   <a:solidFill>
                     <a:srgbClr val="000000"/>
                   </a:solidFill>
@@ -3185,7 +3188,7 @@
             </a:ln>
             <a:extLst>
               <a:ext uri="{91240B29-F687-4f45-9708-019B960494DF}">
-                <a14:hiddenLine xmlns="" xmlns:a14="http://schemas.microsoft.com/office/drawing/2010/main" w="9525">
+                <a14:hiddenLine xmlns:a14="http://schemas.microsoft.com/office/drawing/2010/main" xmlns="" w="9525">
                   <a:solidFill>
                     <a:srgbClr val="000000"/>
                   </a:solidFill>
@@ -3219,7 +3222,7 @@
             </a:ln>
             <a:extLst>
               <a:ext uri="{91240B29-F687-4f45-9708-019B960494DF}">
-                <a14:hiddenLine xmlns="" xmlns:a14="http://schemas.microsoft.com/office/drawing/2010/main" w="9525">
+                <a14:hiddenLine xmlns:a14="http://schemas.microsoft.com/office/drawing/2010/main" xmlns="" w="9525">
                   <a:solidFill>
                     <a:srgbClr val="000000"/>
                   </a:solidFill>
@@ -3284,7 +3287,7 @@
             </a:ln>
             <a:extLst>
               <a:ext uri="{91240B29-F687-4f45-9708-019B960494DF}">
-                <a14:hiddenLine xmlns="" xmlns:a14="http://schemas.microsoft.com/office/drawing/2010/main" w="9525">
+                <a14:hiddenLine xmlns:a14="http://schemas.microsoft.com/office/drawing/2010/main" xmlns="" w="9525">
                   <a:solidFill>
                     <a:srgbClr val="000000"/>
                   </a:solidFill>
@@ -3374,7 +3377,7 @@
             </a:ln>
             <a:extLst>
               <a:ext uri="{91240B29-F687-4f45-9708-019B960494DF}">
-                <a14:hiddenLine xmlns="" xmlns:a14="http://schemas.microsoft.com/office/drawing/2010/main" w="9525">
+                <a14:hiddenLine xmlns:a14="http://schemas.microsoft.com/office/drawing/2010/main" xmlns="" w="9525">
                   <a:solidFill>
                     <a:srgbClr val="000000"/>
                   </a:solidFill>
@@ -3436,7 +3439,7 @@
             </a:ln>
             <a:extLst>
               <a:ext uri="{91240B29-F687-4f45-9708-019B960494DF}">
-                <a14:hiddenLine xmlns="" xmlns:a14="http://schemas.microsoft.com/office/drawing/2010/main" w="9525">
+                <a14:hiddenLine xmlns:a14="http://schemas.microsoft.com/office/drawing/2010/main" xmlns="" w="9525">
                   <a:solidFill>
                     <a:srgbClr val="000000"/>
                   </a:solidFill>
@@ -3526,7 +3529,7 @@
             </a:ln>
             <a:extLst>
               <a:ext uri="{91240B29-F687-4f45-9708-019B960494DF}">
-                <a14:hiddenLine xmlns="" xmlns:a14="http://schemas.microsoft.com/office/drawing/2010/main" w="9525">
+                <a14:hiddenLine xmlns:a14="http://schemas.microsoft.com/office/drawing/2010/main" xmlns="" w="9525">
                   <a:solidFill>
                     <a:srgbClr val="000000"/>
                   </a:solidFill>
@@ -3616,7 +3619,7 @@
             </a:ln>
             <a:extLst>
               <a:ext uri="{91240B29-F687-4f45-9708-019B960494DF}">
-                <a14:hiddenLine xmlns="" xmlns:a14="http://schemas.microsoft.com/office/drawing/2010/main" w="9525">
+                <a14:hiddenLine xmlns:a14="http://schemas.microsoft.com/office/drawing/2010/main" xmlns="" w="9525">
                   <a:solidFill>
                     <a:srgbClr val="000000"/>
                   </a:solidFill>
@@ -3681,7 +3684,7 @@
             </a:ln>
             <a:extLst>
               <a:ext uri="{91240B29-F687-4f45-9708-019B960494DF}">
-                <a14:hiddenLine xmlns="" xmlns:a14="http://schemas.microsoft.com/office/drawing/2010/main" w="9525">
+                <a14:hiddenLine xmlns:a14="http://schemas.microsoft.com/office/drawing/2010/main" xmlns="" w="9525">
                   <a:solidFill>
                     <a:srgbClr val="000000"/>
                   </a:solidFill>
@@ -3743,7 +3746,7 @@
             </a:ln>
             <a:extLst>
               <a:ext uri="{91240B29-F687-4f45-9708-019B960494DF}">
-                <a14:hiddenLine xmlns="" xmlns:a14="http://schemas.microsoft.com/office/drawing/2010/main" w="9525">
+                <a14:hiddenLine xmlns:a14="http://schemas.microsoft.com/office/drawing/2010/main" xmlns="" w="9525">
                   <a:solidFill>
                     <a:srgbClr val="000000"/>
                   </a:solidFill>
@@ -3833,7 +3836,7 @@
             </a:ln>
             <a:extLst>
               <a:ext uri="{91240B29-F687-4f45-9708-019B960494DF}">
-                <a14:hiddenLine xmlns="" xmlns:a14="http://schemas.microsoft.com/office/drawing/2010/main" w="9525">
+                <a14:hiddenLine xmlns:a14="http://schemas.microsoft.com/office/drawing/2010/main" xmlns="" w="9525">
                   <a:solidFill>
                     <a:srgbClr val="000000"/>
                   </a:solidFill>
@@ -3923,7 +3926,7 @@
             </a:ln>
             <a:extLst>
               <a:ext uri="{91240B29-F687-4f45-9708-019B960494DF}">
-                <a14:hiddenLine xmlns="" xmlns:a14="http://schemas.microsoft.com/office/drawing/2010/main" w="9525">
+                <a14:hiddenLine xmlns:a14="http://schemas.microsoft.com/office/drawing/2010/main" xmlns="" w="9525">
                   <a:solidFill>
                     <a:srgbClr val="000000"/>
                   </a:solidFill>
@@ -3985,7 +3988,7 @@
             </a:ln>
             <a:extLst>
               <a:ext uri="{91240B29-F687-4f45-9708-019B960494DF}">
-                <a14:hiddenLine xmlns="" xmlns:a14="http://schemas.microsoft.com/office/drawing/2010/main" w="9525">
+                <a14:hiddenLine xmlns:a14="http://schemas.microsoft.com/office/drawing/2010/main" xmlns="" w="9525">
                   <a:solidFill>
                     <a:srgbClr val="000000"/>
                   </a:solidFill>
@@ -4105,7 +4108,7 @@
             </a:ln>
             <a:extLst>
               <a:ext uri="{91240B29-F687-4f45-9708-019B960494DF}">
-                <a14:hiddenLine xmlns="" xmlns:a14="http://schemas.microsoft.com/office/drawing/2010/main" w="9525">
+                <a14:hiddenLine xmlns:a14="http://schemas.microsoft.com/office/drawing/2010/main" xmlns="" w="9525">
                   <a:solidFill>
                     <a:srgbClr val="000000"/>
                   </a:solidFill>
@@ -4173,7 +4176,7 @@
             </a:ln>
             <a:extLst>
               <a:ext uri="{91240B29-F687-4f45-9708-019B960494DF}">
-                <a14:hiddenLine xmlns="" xmlns:a14="http://schemas.microsoft.com/office/drawing/2010/main" w="9525">
+                <a14:hiddenLine xmlns:a14="http://schemas.microsoft.com/office/drawing/2010/main" xmlns="" w="9525">
                   <a:solidFill>
                     <a:srgbClr val="000000"/>
                   </a:solidFill>
@@ -4263,7 +4266,7 @@
             </a:ln>
             <a:extLst>
               <a:ext uri="{91240B29-F687-4f45-9708-019B960494DF}">
-                <a14:hiddenLine xmlns="" xmlns:a14="http://schemas.microsoft.com/office/drawing/2010/main" w="9525">
+                <a14:hiddenLine xmlns:a14="http://schemas.microsoft.com/office/drawing/2010/main" xmlns="" w="9525">
                   <a:solidFill>
                     <a:srgbClr val="000000"/>
                   </a:solidFill>
@@ -4403,7 +4406,7 @@
           <a:p>
             <a:fld id="{48A87A34-81AB-432B-8DAE-1953F412C126}" type="datetimeFigureOut">
               <a:rPr lang="en-US" dirty="0"/>
-              <a:t>4/8/2025</a:t>
+              <a:t>4/9/2025</a:t>
             </a:fld>
             <a:endParaRPr lang="en-US" dirty="0"/>
           </a:p>
@@ -4574,7 +4577,7 @@
               <a:buNone/>
             </a:pPr>
             <a:r>
-              <a:rPr lang="es-ES"/>
+              <a:rPr lang="es-ES" dirty="0"/>
               <a:t>Haga clic en el icono para agregar una imagen</a:t>
             </a:r>
             <a:endParaRPr lang="en-US" dirty="0"/>
@@ -4665,7 +4668,7 @@
           <a:p>
             <a:fld id="{48A87A34-81AB-432B-8DAE-1953F412C126}" type="datetimeFigureOut">
               <a:rPr lang="en-US" dirty="0"/>
-              <a:t>4/8/2025</a:t>
+              <a:t>4/9/2025</a:t>
             </a:fld>
             <a:endParaRPr lang="en-US" dirty="0"/>
           </a:p>
@@ -4856,7 +4859,7 @@
           <a:p>
             <a:fld id="{48A87A34-81AB-432B-8DAE-1953F412C126}" type="datetimeFigureOut">
               <a:rPr lang="en-US" dirty="0"/>
-              <a:t>4/8/2025</a:t>
+              <a:t>4/9/2025</a:t>
             </a:fld>
             <a:endParaRPr lang="en-US" dirty="0"/>
           </a:p>
@@ -5114,7 +5117,7 @@
           <a:p>
             <a:fld id="{48A87A34-81AB-432B-8DAE-1953F412C126}" type="datetimeFigureOut">
               <a:rPr lang="en-US" dirty="0"/>
-              <a:t>4/8/2025</a:t>
+              <a:t>4/9/2025</a:t>
             </a:fld>
             <a:endParaRPr lang="en-US" dirty="0"/>
           </a:p>
@@ -5543,7 +5546,7 @@
           <a:p>
             <a:fld id="{48A87A34-81AB-432B-8DAE-1953F412C126}" type="datetimeFigureOut">
               <a:rPr lang="en-US" dirty="0"/>
-              <a:t>4/8/2025</a:t>
+              <a:t>4/9/2025</a:t>
             </a:fld>
             <a:endParaRPr lang="en-US" dirty="0"/>
           </a:p>
@@ -6084,7 +6087,7 @@
           <a:p>
             <a:fld id="{48A87A34-81AB-432B-8DAE-1953F412C126}" type="datetimeFigureOut">
               <a:rPr lang="en-US" dirty="0"/>
-              <a:t>4/8/2025</a:t>
+              <a:t>4/9/2025</a:t>
             </a:fld>
             <a:endParaRPr lang="en-US" dirty="0"/>
           </a:p>
@@ -6310,7 +6313,7 @@
               <a:buNone/>
             </a:pPr>
             <a:r>
-              <a:rPr lang="es-ES"/>
+              <a:rPr lang="es-ES" dirty="0"/>
               <a:t>Haga clic en el icono para agregar una imagen</a:t>
             </a:r>
             <a:endParaRPr lang="en-US" dirty="0"/>
@@ -6509,7 +6512,7 @@
               <a:buNone/>
             </a:pPr>
             <a:r>
-              <a:rPr lang="es-ES"/>
+              <a:rPr lang="es-ES" dirty="0"/>
               <a:t>Haga clic en el icono para agregar una imagen</a:t>
             </a:r>
             <a:endParaRPr lang="en-US" dirty="0"/>
@@ -6708,7 +6711,7 @@
               <a:buNone/>
             </a:pPr>
             <a:r>
-              <a:rPr lang="es-ES"/>
+              <a:rPr lang="es-ES" dirty="0"/>
               <a:t>Haga clic en el icono para agregar una imagen</a:t>
             </a:r>
             <a:endParaRPr lang="en-US" dirty="0"/>
@@ -6799,7 +6802,7 @@
           <a:p>
             <a:fld id="{48A87A34-81AB-432B-8DAE-1953F412C126}" type="datetimeFigureOut">
               <a:rPr lang="en-US" dirty="0"/>
-              <a:t>4/8/2025</a:t>
+              <a:t>4/9/2025</a:t>
             </a:fld>
             <a:endParaRPr lang="en-US" dirty="0"/>
           </a:p>
@@ -6964,7 +6967,7 @@
           <a:p>
             <a:fld id="{48A87A34-81AB-432B-8DAE-1953F412C126}" type="datetimeFigureOut">
               <a:rPr lang="en-US" dirty="0"/>
-              <a:t>4/8/2025</a:t>
+              <a:t>4/9/2025</a:t>
             </a:fld>
             <a:endParaRPr lang="en-US" dirty="0"/>
           </a:p>
@@ -7139,7 +7142,7 @@
           <a:p>
             <a:fld id="{48A87A34-81AB-432B-8DAE-1953F412C126}" type="datetimeFigureOut">
               <a:rPr lang="en-US" dirty="0"/>
-              <a:t>4/8/2025</a:t>
+              <a:t>4/9/2025</a:t>
             </a:fld>
             <a:endParaRPr lang="en-US" dirty="0"/>
           </a:p>
@@ -7304,7 +7307,7 @@
           <a:p>
             <a:fld id="{48A87A34-81AB-432B-8DAE-1953F412C126}" type="datetimeFigureOut">
               <a:rPr lang="en-US" dirty="0"/>
-              <a:t>4/8/2025</a:t>
+              <a:t>4/9/2025</a:t>
             </a:fld>
             <a:endParaRPr lang="en-US" dirty="0"/>
           </a:p>
@@ -7549,7 +7552,7 @@
           <a:p>
             <a:fld id="{48A87A34-81AB-432B-8DAE-1953F412C126}" type="datetimeFigureOut">
               <a:rPr lang="en-US" dirty="0"/>
-              <a:t>4/8/2025</a:t>
+              <a:t>4/9/2025</a:t>
             </a:fld>
             <a:endParaRPr lang="en-US" dirty="0"/>
           </a:p>
@@ -7776,7 +7779,7 @@
           <a:p>
             <a:fld id="{48A87A34-81AB-432B-8DAE-1953F412C126}" type="datetimeFigureOut">
               <a:rPr lang="en-US" dirty="0"/>
-              <a:t>4/8/2025</a:t>
+              <a:t>4/9/2025</a:t>
             </a:fld>
             <a:endParaRPr lang="en-US" dirty="0"/>
           </a:p>
@@ -8152,7 +8155,7 @@
           <a:p>
             <a:fld id="{48A87A34-81AB-432B-8DAE-1953F412C126}" type="datetimeFigureOut">
               <a:rPr lang="en-US" dirty="0"/>
-              <a:t>4/8/2025</a:t>
+              <a:t>4/9/2025</a:t>
             </a:fld>
             <a:endParaRPr lang="en-US" dirty="0"/>
           </a:p>
@@ -8265,7 +8268,7 @@
           <a:p>
             <a:fld id="{48A87A34-81AB-432B-8DAE-1953F412C126}" type="datetimeFigureOut">
               <a:rPr lang="en-US" dirty="0"/>
-              <a:t>4/8/2025</a:t>
+              <a:t>4/9/2025</a:t>
             </a:fld>
             <a:endParaRPr lang="en-US" dirty="0"/>
           </a:p>
@@ -8355,7 +8358,7 @@
           <a:p>
             <a:fld id="{48A87A34-81AB-432B-8DAE-1953F412C126}" type="datetimeFigureOut">
               <a:rPr lang="en-US" dirty="0"/>
-              <a:t>4/8/2025</a:t>
+              <a:t>4/9/2025</a:t>
             </a:fld>
             <a:endParaRPr lang="en-US" dirty="0"/>
           </a:p>
@@ -8599,7 +8602,7 @@
           <a:p>
             <a:fld id="{48A87A34-81AB-432B-8DAE-1953F412C126}" type="datetimeFigureOut">
               <a:rPr lang="en-US" dirty="0"/>
-              <a:t>4/8/2025</a:t>
+              <a:t>4/9/2025</a:t>
             </a:fld>
             <a:endParaRPr lang="en-US" dirty="0"/>
           </a:p>
@@ -8785,7 +8788,7 @@
           </a:lstStyle>
           <a:p>
             <a:r>
-              <a:rPr lang="es-ES"/>
+              <a:rPr lang="es-ES" dirty="0"/>
               <a:t>Haga clic en el icono para agregar una imagen</a:t>
             </a:r>
             <a:endParaRPr lang="en-US" dirty="0"/>
@@ -8874,7 +8877,7 @@
           <a:p>
             <a:fld id="{48A87A34-81AB-432B-8DAE-1953F412C126}" type="datetimeFigureOut">
               <a:rPr lang="en-US" dirty="0"/>
-              <a:t>4/8/2025</a:t>
+              <a:t>4/9/2025</a:t>
             </a:fld>
             <a:endParaRPr lang="en-US" dirty="0"/>
           </a:p>
@@ -8985,7 +8988,7 @@
           <a:noFill/>
           <a:extLst>
             <a:ext uri="{909E8E84-426E-40dd-AFC4-6F175D3DCCD1}">
-              <a14:hiddenFill xmlns="" xmlns:a14="http://schemas.microsoft.com/office/drawing/2010/main">
+              <a14:hiddenFill xmlns:a14="http://schemas.microsoft.com/office/drawing/2010/main" xmlns="">
                 <a:solidFill>
                   <a:srgbClr val="FFFFFF"/>
                 </a:solidFill>
@@ -9059,7 +9062,7 @@
               </a:ln>
               <a:extLst>
                 <a:ext uri="{91240B29-F687-4f45-9708-019B960494DF}">
-                  <a14:hiddenLine xmlns="" xmlns:a14="http://schemas.microsoft.com/office/drawing/2010/main" w="9525">
+                  <a14:hiddenLine xmlns:a14="http://schemas.microsoft.com/office/drawing/2010/main" xmlns="" w="9525">
                     <a:solidFill>
                       <a:srgbClr val="000000"/>
                     </a:solidFill>
@@ -9149,7 +9152,7 @@
               </a:ln>
               <a:extLst>
                 <a:ext uri="{91240B29-F687-4f45-9708-019B960494DF}">
-                  <a14:hiddenLine xmlns="" xmlns:a14="http://schemas.microsoft.com/office/drawing/2010/main" w="9525">
+                  <a14:hiddenLine xmlns:a14="http://schemas.microsoft.com/office/drawing/2010/main" xmlns="" w="9525">
                     <a:solidFill>
                       <a:srgbClr val="000000"/>
                     </a:solidFill>
@@ -9239,7 +9242,7 @@
               </a:ln>
               <a:extLst>
                 <a:ext uri="{91240B29-F687-4f45-9708-019B960494DF}">
-                  <a14:hiddenLine xmlns="" xmlns:a14="http://schemas.microsoft.com/office/drawing/2010/main" w="9525">
+                  <a14:hiddenLine xmlns:a14="http://schemas.microsoft.com/office/drawing/2010/main" xmlns="" w="9525">
                     <a:solidFill>
                       <a:srgbClr val="000000"/>
                     </a:solidFill>
@@ -9301,7 +9304,7 @@
               </a:ln>
               <a:extLst>
                 <a:ext uri="{91240B29-F687-4f45-9708-019B960494DF}">
-                  <a14:hiddenLine xmlns="" xmlns:a14="http://schemas.microsoft.com/office/drawing/2010/main" w="9525">
+                  <a14:hiddenLine xmlns:a14="http://schemas.microsoft.com/office/drawing/2010/main" xmlns="" w="9525">
                     <a:solidFill>
                       <a:srgbClr val="000000"/>
                     </a:solidFill>
@@ -9391,7 +9394,7 @@
               </a:ln>
               <a:extLst>
                 <a:ext uri="{91240B29-F687-4f45-9708-019B960494DF}">
-                  <a14:hiddenLine xmlns="" xmlns:a14="http://schemas.microsoft.com/office/drawing/2010/main" w="9525">
+                  <a14:hiddenLine xmlns:a14="http://schemas.microsoft.com/office/drawing/2010/main" xmlns="" w="9525">
                     <a:solidFill>
                       <a:srgbClr val="000000"/>
                     </a:solidFill>
@@ -9453,7 +9456,7 @@
               </a:ln>
               <a:extLst>
                 <a:ext uri="{91240B29-F687-4f45-9708-019B960494DF}">
-                  <a14:hiddenLine xmlns="" xmlns:a14="http://schemas.microsoft.com/office/drawing/2010/main" w="9525">
+                  <a14:hiddenLine xmlns:a14="http://schemas.microsoft.com/office/drawing/2010/main" xmlns="" w="9525">
                     <a:solidFill>
                       <a:srgbClr val="000000"/>
                     </a:solidFill>
@@ -9515,7 +9518,7 @@
               </a:ln>
               <a:extLst>
                 <a:ext uri="{91240B29-F687-4f45-9708-019B960494DF}">
-                  <a14:hiddenLine xmlns="" xmlns:a14="http://schemas.microsoft.com/office/drawing/2010/main" w="9525">
+                  <a14:hiddenLine xmlns:a14="http://schemas.microsoft.com/office/drawing/2010/main" xmlns="" w="9525">
                     <a:solidFill>
                       <a:srgbClr val="000000"/>
                     </a:solidFill>
@@ -9605,7 +9608,7 @@
               </a:ln>
               <a:extLst>
                 <a:ext uri="{91240B29-F687-4f45-9708-019B960494DF}">
-                  <a14:hiddenLine xmlns="" xmlns:a14="http://schemas.microsoft.com/office/drawing/2010/main" w="9525">
+                  <a14:hiddenLine xmlns:a14="http://schemas.microsoft.com/office/drawing/2010/main" xmlns="" w="9525">
                     <a:solidFill>
                       <a:srgbClr val="000000"/>
                     </a:solidFill>
@@ -9695,7 +9698,7 @@
               </a:ln>
               <a:extLst>
                 <a:ext uri="{91240B29-F687-4f45-9708-019B960494DF}">
-                  <a14:hiddenLine xmlns="" xmlns:a14="http://schemas.microsoft.com/office/drawing/2010/main" w="9525">
+                  <a14:hiddenLine xmlns:a14="http://schemas.microsoft.com/office/drawing/2010/main" xmlns="" w="9525">
                     <a:solidFill>
                       <a:srgbClr val="000000"/>
                     </a:solidFill>
@@ -9757,7 +9760,7 @@
               </a:ln>
               <a:extLst>
                 <a:ext uri="{91240B29-F687-4f45-9708-019B960494DF}">
-                  <a14:hiddenLine xmlns="" xmlns:a14="http://schemas.microsoft.com/office/drawing/2010/main" w="9525">
+                  <a14:hiddenLine xmlns:a14="http://schemas.microsoft.com/office/drawing/2010/main" xmlns="" w="9525">
                     <a:solidFill>
                       <a:srgbClr val="000000"/>
                     </a:solidFill>
@@ -9867,7 +9870,7 @@
               </a:ln>
               <a:extLst>
                 <a:ext uri="{91240B29-F687-4f45-9708-019B960494DF}">
-                  <a14:hiddenLine xmlns="" xmlns:a14="http://schemas.microsoft.com/office/drawing/2010/main" w="9525">
+                  <a14:hiddenLine xmlns:a14="http://schemas.microsoft.com/office/drawing/2010/main" xmlns="" w="9525">
                     <a:solidFill>
                       <a:srgbClr val="000000"/>
                     </a:solidFill>
@@ -9951,7 +9954,7 @@
               </a:ln>
               <a:extLst>
                 <a:ext uri="{91240B29-F687-4f45-9708-019B960494DF}">
-                  <a14:hiddenLine xmlns="" xmlns:a14="http://schemas.microsoft.com/office/drawing/2010/main" w="9525">
+                  <a14:hiddenLine xmlns:a14="http://schemas.microsoft.com/office/drawing/2010/main" xmlns="" w="9525">
                     <a:solidFill>
                       <a:srgbClr val="000000"/>
                     </a:solidFill>
@@ -10013,7 +10016,7 @@
               </a:ln>
               <a:extLst>
                 <a:ext uri="{91240B29-F687-4f45-9708-019B960494DF}">
-                  <a14:hiddenLine xmlns="" xmlns:a14="http://schemas.microsoft.com/office/drawing/2010/main" w="9525">
+                  <a14:hiddenLine xmlns:a14="http://schemas.microsoft.com/office/drawing/2010/main" xmlns="" w="9525">
                     <a:solidFill>
                       <a:srgbClr val="000000"/>
                     </a:solidFill>
@@ -10075,7 +10078,7 @@
               </a:ln>
               <a:extLst>
                 <a:ext uri="{91240B29-F687-4f45-9708-019B960494DF}">
-                  <a14:hiddenLine xmlns="" xmlns:a14="http://schemas.microsoft.com/office/drawing/2010/main" w="9525">
+                  <a14:hiddenLine xmlns:a14="http://schemas.microsoft.com/office/drawing/2010/main" xmlns="" w="9525">
                     <a:solidFill>
                       <a:srgbClr val="000000"/>
                     </a:solidFill>
@@ -10165,7 +10168,7 @@
               </a:ln>
               <a:extLst>
                 <a:ext uri="{91240B29-F687-4f45-9708-019B960494DF}">
-                  <a14:hiddenLine xmlns="" xmlns:a14="http://schemas.microsoft.com/office/drawing/2010/main" w="9525">
+                  <a14:hiddenLine xmlns:a14="http://schemas.microsoft.com/office/drawing/2010/main" xmlns="" w="9525">
                     <a:solidFill>
                       <a:srgbClr val="000000"/>
                     </a:solidFill>
@@ -10199,7 +10202,7 @@
               </a:ln>
               <a:extLst>
                 <a:ext uri="{91240B29-F687-4f45-9708-019B960494DF}">
-                  <a14:hiddenLine xmlns="" xmlns:a14="http://schemas.microsoft.com/office/drawing/2010/main" w="9525">
+                  <a14:hiddenLine xmlns:a14="http://schemas.microsoft.com/office/drawing/2010/main" xmlns="" w="9525">
                     <a:solidFill>
                       <a:srgbClr val="000000"/>
                     </a:solidFill>
@@ -10264,7 +10267,7 @@
               </a:ln>
               <a:extLst>
                 <a:ext uri="{91240B29-F687-4f45-9708-019B960494DF}">
-                  <a14:hiddenLine xmlns="" xmlns:a14="http://schemas.microsoft.com/office/drawing/2010/main" w="9525">
+                  <a14:hiddenLine xmlns:a14="http://schemas.microsoft.com/office/drawing/2010/main" xmlns="" w="9525">
                     <a:solidFill>
                       <a:srgbClr val="000000"/>
                     </a:solidFill>
@@ -10354,7 +10357,7 @@
               </a:ln>
               <a:extLst>
                 <a:ext uri="{91240B29-F687-4f45-9708-019B960494DF}">
-                  <a14:hiddenLine xmlns="" xmlns:a14="http://schemas.microsoft.com/office/drawing/2010/main" w="9525">
+                  <a14:hiddenLine xmlns:a14="http://schemas.microsoft.com/office/drawing/2010/main" xmlns="" w="9525">
                     <a:solidFill>
                       <a:srgbClr val="000000"/>
                     </a:solidFill>
@@ -10416,7 +10419,7 @@
               </a:ln>
               <a:extLst>
                 <a:ext uri="{91240B29-F687-4f45-9708-019B960494DF}">
-                  <a14:hiddenLine xmlns="" xmlns:a14="http://schemas.microsoft.com/office/drawing/2010/main" w="9525">
+                  <a14:hiddenLine xmlns:a14="http://schemas.microsoft.com/office/drawing/2010/main" xmlns="" w="9525">
                     <a:solidFill>
                       <a:srgbClr val="000000"/>
                     </a:solidFill>
@@ -10506,7 +10509,7 @@
               </a:ln>
               <a:extLst>
                 <a:ext uri="{91240B29-F687-4f45-9708-019B960494DF}">
-                  <a14:hiddenLine xmlns="" xmlns:a14="http://schemas.microsoft.com/office/drawing/2010/main" w="9525">
+                  <a14:hiddenLine xmlns:a14="http://schemas.microsoft.com/office/drawing/2010/main" xmlns="" w="9525">
                     <a:solidFill>
                       <a:srgbClr val="000000"/>
                     </a:solidFill>
@@ -10571,7 +10574,7 @@
               </a:ln>
               <a:extLst>
                 <a:ext uri="{91240B29-F687-4f45-9708-019B960494DF}">
-                  <a14:hiddenLine xmlns="" xmlns:a14="http://schemas.microsoft.com/office/drawing/2010/main" w="9525">
+                  <a14:hiddenLine xmlns:a14="http://schemas.microsoft.com/office/drawing/2010/main" xmlns="" w="9525">
                     <a:solidFill>
                       <a:srgbClr val="000000"/>
                     </a:solidFill>
@@ -10633,7 +10636,7 @@
               </a:ln>
               <a:extLst>
                 <a:ext uri="{91240B29-F687-4f45-9708-019B960494DF}">
-                  <a14:hiddenLine xmlns="" xmlns:a14="http://schemas.microsoft.com/office/drawing/2010/main" w="9525">
+                  <a14:hiddenLine xmlns:a14="http://schemas.microsoft.com/office/drawing/2010/main" xmlns="" w="9525">
                     <a:solidFill>
                       <a:srgbClr val="000000"/>
                     </a:solidFill>
@@ -10723,7 +10726,7 @@
               </a:ln>
               <a:extLst>
                 <a:ext uri="{91240B29-F687-4f45-9708-019B960494DF}">
-                  <a14:hiddenLine xmlns="" xmlns:a14="http://schemas.microsoft.com/office/drawing/2010/main" w="9525">
+                  <a14:hiddenLine xmlns:a14="http://schemas.microsoft.com/office/drawing/2010/main" xmlns="" w="9525">
                     <a:solidFill>
                       <a:srgbClr val="000000"/>
                     </a:solidFill>
@@ -10813,7 +10816,7 @@
               </a:ln>
               <a:extLst>
                 <a:ext uri="{91240B29-F687-4f45-9708-019B960494DF}">
-                  <a14:hiddenLine xmlns="" xmlns:a14="http://schemas.microsoft.com/office/drawing/2010/main" w="9525">
+                  <a14:hiddenLine xmlns:a14="http://schemas.microsoft.com/office/drawing/2010/main" xmlns="" w="9525">
                     <a:solidFill>
                       <a:srgbClr val="000000"/>
                     </a:solidFill>
@@ -10878,7 +10881,7 @@
               </a:ln>
               <a:extLst>
                 <a:ext uri="{91240B29-F687-4f45-9708-019B960494DF}">
-                  <a14:hiddenLine xmlns="" xmlns:a14="http://schemas.microsoft.com/office/drawing/2010/main" w="9525">
+                  <a14:hiddenLine xmlns:a14="http://schemas.microsoft.com/office/drawing/2010/main" xmlns="" w="9525">
                     <a:solidFill>
                       <a:srgbClr val="000000"/>
                     </a:solidFill>
@@ -10998,7 +11001,7 @@
               </a:ln>
               <a:extLst>
                 <a:ext uri="{91240B29-F687-4f45-9708-019B960494DF}">
-                  <a14:hiddenLine xmlns="" xmlns:a14="http://schemas.microsoft.com/office/drawing/2010/main" w="9525">
+                  <a14:hiddenLine xmlns:a14="http://schemas.microsoft.com/office/drawing/2010/main" xmlns="" w="9525">
                     <a:solidFill>
                       <a:srgbClr val="000000"/>
                     </a:solidFill>
@@ -11096,7 +11099,7 @@
               </a:ln>
               <a:extLst>
                 <a:ext uri="{91240B29-F687-4f45-9708-019B960494DF}">
-                  <a14:hiddenLine xmlns="" xmlns:a14="http://schemas.microsoft.com/office/drawing/2010/main" w="9525">
+                  <a14:hiddenLine xmlns:a14="http://schemas.microsoft.com/office/drawing/2010/main" xmlns="" w="9525">
                     <a:solidFill>
                       <a:srgbClr val="000000"/>
                     </a:solidFill>
@@ -11211,7 +11214,7 @@
               </a:ln>
               <a:extLst>
                 <a:ext uri="{91240B29-F687-4f45-9708-019B960494DF}">
-                  <a14:hiddenLine xmlns="" xmlns:a14="http://schemas.microsoft.com/office/drawing/2010/main" w="9525">
+                  <a14:hiddenLine xmlns:a14="http://schemas.microsoft.com/office/drawing/2010/main" xmlns="" w="9525">
                     <a:solidFill>
                       <a:srgbClr val="000000"/>
                     </a:solidFill>
@@ -11301,7 +11304,7 @@
               </a:ln>
               <a:extLst>
                 <a:ext uri="{91240B29-F687-4f45-9708-019B960494DF}">
-                  <a14:hiddenLine xmlns="" xmlns:a14="http://schemas.microsoft.com/office/drawing/2010/main" w="9525">
+                  <a14:hiddenLine xmlns:a14="http://schemas.microsoft.com/office/drawing/2010/main" xmlns="" w="9525">
                     <a:solidFill>
                       <a:srgbClr val="000000"/>
                     </a:solidFill>
@@ -11366,7 +11369,7 @@
               </a:ln>
               <a:extLst>
                 <a:ext uri="{91240B29-F687-4f45-9708-019B960494DF}">
-                  <a14:hiddenLine xmlns="" xmlns:a14="http://schemas.microsoft.com/office/drawing/2010/main" w="9525">
+                  <a14:hiddenLine xmlns:a14="http://schemas.microsoft.com/office/drawing/2010/main" xmlns="" w="9525">
                     <a:solidFill>
                       <a:srgbClr val="000000"/>
                     </a:solidFill>
@@ -11456,7 +11459,7 @@
               </a:ln>
               <a:extLst>
                 <a:ext uri="{91240B29-F687-4f45-9708-019B960494DF}">
-                  <a14:hiddenLine xmlns="" xmlns:a14="http://schemas.microsoft.com/office/drawing/2010/main" w="9525">
+                  <a14:hiddenLine xmlns:a14="http://schemas.microsoft.com/office/drawing/2010/main" xmlns="" w="9525">
                     <a:solidFill>
                       <a:srgbClr val="000000"/>
                     </a:solidFill>
@@ -11524,7 +11527,7 @@
               </a:ln>
               <a:extLst>
                 <a:ext uri="{91240B29-F687-4f45-9708-019B960494DF}">
-                  <a14:hiddenLine xmlns="" xmlns:a14="http://schemas.microsoft.com/office/drawing/2010/main" w="9525">
+                  <a14:hiddenLine xmlns:a14="http://schemas.microsoft.com/office/drawing/2010/main" xmlns="" w="9525">
                     <a:solidFill>
                       <a:srgbClr val="000000"/>
                     </a:solidFill>
@@ -11614,7 +11617,7 @@
               </a:ln>
               <a:extLst>
                 <a:ext uri="{91240B29-F687-4f45-9708-019B960494DF}">
-                  <a14:hiddenLine xmlns="" xmlns:a14="http://schemas.microsoft.com/office/drawing/2010/main" w="9525">
+                  <a14:hiddenLine xmlns:a14="http://schemas.microsoft.com/office/drawing/2010/main" xmlns="" w="9525">
                     <a:solidFill>
                       <a:srgbClr val="000000"/>
                     </a:solidFill>
@@ -11682,7 +11685,7 @@
               </a:ln>
               <a:extLst>
                 <a:ext uri="{91240B29-F687-4f45-9708-019B960494DF}">
-                  <a14:hiddenLine xmlns="" xmlns:a14="http://schemas.microsoft.com/office/drawing/2010/main" w="9525">
+                  <a14:hiddenLine xmlns:a14="http://schemas.microsoft.com/office/drawing/2010/main" xmlns="" w="9525">
                     <a:solidFill>
                       <a:srgbClr val="000000"/>
                     </a:solidFill>
@@ -11772,7 +11775,7 @@
               </a:ln>
               <a:extLst>
                 <a:ext uri="{91240B29-F687-4f45-9708-019B960494DF}">
-                  <a14:hiddenLine xmlns="" xmlns:a14="http://schemas.microsoft.com/office/drawing/2010/main" w="9525">
+                  <a14:hiddenLine xmlns:a14="http://schemas.microsoft.com/office/drawing/2010/main" xmlns="" w="9525">
                     <a:solidFill>
                       <a:srgbClr val="000000"/>
                     </a:solidFill>
@@ -11806,7 +11809,7 @@
               </a:ln>
               <a:extLst>
                 <a:ext uri="{91240B29-F687-4f45-9708-019B960494DF}">
-                  <a14:hiddenLine xmlns="" xmlns:a14="http://schemas.microsoft.com/office/drawing/2010/main" w="9525">
+                  <a14:hiddenLine xmlns:a14="http://schemas.microsoft.com/office/drawing/2010/main" xmlns="" w="9525">
                     <a:solidFill>
                       <a:srgbClr val="000000"/>
                     </a:solidFill>
@@ -11947,7 +11950,7 @@
             <a:fld id="{48A87A34-81AB-432B-8DAE-1953F412C126}" type="datetimeFigureOut">
               <a:rPr lang="en-US" dirty="0"/>
               <a:pPr/>
-              <a:t>4/8/2025</a:t>
+              <a:t>4/9/2025</a:t>
             </a:fld>
             <a:endParaRPr lang="en-US" dirty="0"/>
           </a:p>
@@ -12379,7 +12382,12 @@
             <p:ph type="ctrTitle"/>
           </p:nvPr>
         </p:nvSpPr>
-        <p:spPr/>
+        <p:spPr>
+          <a:xfrm>
+            <a:off x="3984624" y="893763"/>
+            <a:ext cx="8791575" cy="2387600"/>
+          </a:xfrm>
+        </p:spPr>
         <p:txBody>
           <a:bodyPr/>
           <a:lstStyle/>
@@ -12637,7 +12645,11 @@
               <a:t>Usando </a:t>
             </a:r>
             <a:r>
-              <a:rPr lang="es-ES" dirty="0" err="1"/>
+              <a:rPr lang="es-ES" b="1" dirty="0">
+                <a:solidFill>
+                  <a:schemeClr val="bg1"/>
+                </a:solidFill>
+              </a:rPr>
               <a:t>rbind</a:t>
             </a:r>
             <a:r>
@@ -12651,18 +12663,17 @@
               <a:t>Usando </a:t>
             </a:r>
             <a:r>
-              <a:rPr lang="es-ES" dirty="0" err="1"/>
+              <a:rPr lang="es-ES" b="1" dirty="0">
+                <a:solidFill>
+                  <a:schemeClr val="bg1"/>
+                </a:solidFill>
+              </a:rPr>
               <a:t>cbind</a:t>
             </a:r>
             <a:r>
               <a:rPr lang="es-ES" dirty="0"/>
-              <a:t>, nos devolverá una matriz con las </a:t>
-            </a:r>
-            <a:r>
-              <a:rPr lang="es-ES" dirty="0" err="1"/>
-              <a:t>columas</a:t>
-            </a:r>
-            <a:endParaRPr lang="es-ES" dirty="0"/>
+              <a:t>, nos devolverá una matriz con las columnas</a:t>
+            </a:r>
           </a:p>
         </p:txBody>
       </p:sp>
@@ -12802,7 +12813,7 @@
         </p:nvSpPr>
         <p:spPr>
           <a:xfrm>
-            <a:off x="6824133" y="1117600"/>
+            <a:off x="6180666" y="1634067"/>
             <a:ext cx="4223278" cy="4673601"/>
           </a:xfrm>
         </p:spPr>
@@ -12812,7 +12823,7 @@
           <a:p>
             <a:r>
               <a:rPr lang="es-ES" dirty="0"/>
-              <a:t>Si queremos tener acceso a los datos de alguna matriz por ejemplo el numero 13 tenemos que usar los índices de fila y de columna.</a:t>
+              <a:t>Si queremos tener acceso a los datos de alguna matriz por ejemplo el numero 13, tenemos que usar los índices de fila y de columna.</a:t>
             </a:r>
           </a:p>
           <a:p>
@@ -12851,8 +12862,8 @@
         </p:blipFill>
         <p:spPr>
           <a:xfrm>
-            <a:off x="1291536" y="2428735"/>
-            <a:ext cx="2276793" cy="2000529"/>
+            <a:off x="1141413" y="2242469"/>
+            <a:ext cx="3091920" cy="2716749"/>
           </a:xfrm>
           <a:prstGeom prst="rect">
             <a:avLst/>
@@ -12935,8 +12946,8 @@
         </p:nvSpPr>
         <p:spPr>
           <a:xfrm>
-            <a:off x="6333067" y="1838103"/>
-            <a:ext cx="4443411" cy="4885268"/>
+            <a:off x="5003800" y="2318279"/>
+            <a:ext cx="5637211" cy="4885268"/>
           </a:xfrm>
         </p:spPr>
         <p:txBody>
@@ -12945,15 +12956,19 @@
           <a:p>
             <a:r>
               <a:rPr lang="es-ES" dirty="0"/>
-              <a:t>Si queremos cambiar un numero, aplicamos lo siguiente “m1[3,2] &lt;-20]” </a:t>
-            </a:r>
-            <a:r>
-              <a:rPr lang="es-ES" dirty="0" err="1"/>
-              <a:t>asi</a:t>
+              <a:t>Si queremos cambiar un numero, aplicamos lo siguiente </a:t>
+            </a:r>
+            <a:r>
+              <a:rPr lang="es-ES" b="1" dirty="0">
+                <a:solidFill>
+                  <a:schemeClr val="bg1"/>
+                </a:solidFill>
+              </a:rPr>
+              <a:t>“m1[3,2] &lt;-20]”</a:t>
             </a:r>
             <a:r>
               <a:rPr lang="es-ES" dirty="0"/>
-              <a:t> hemos convertido el numero 8 en un 20</a:t>
+              <a:t> así hemos convertido el numero 8 en un 20</a:t>
             </a:r>
           </a:p>
           <a:p>
@@ -13110,15 +13125,15 @@
           <a:p>
             <a:r>
               <a:rPr lang="es-ES" dirty="0"/>
-              <a:t>Para conocer el tamaño de una matriz “</a:t>
-            </a:r>
-            <a:r>
-              <a:rPr lang="es-ES" dirty="0" err="1"/>
-              <a:t>dim</a:t>
-            </a:r>
-            <a:r>
-              <a:rPr lang="es-ES" dirty="0"/>
-              <a:t>(m1)”</a:t>
+              <a:t>Para conocer el tamaño de una matriz </a:t>
+            </a:r>
+            <a:r>
+              <a:rPr lang="es-ES" b="1" dirty="0">
+                <a:solidFill>
+                  <a:schemeClr val="bg1"/>
+                </a:solidFill>
+              </a:rPr>
+              <a:t>“dim(m1)”</a:t>
             </a:r>
           </a:p>
         </p:txBody>
@@ -13206,15 +13221,7 @@
           <a:p>
             <a:r>
               <a:rPr lang="es-ES" dirty="0"/>
-              <a:t>Data </a:t>
-            </a:r>
-            <a:r>
-              <a:rPr lang="es-ES" dirty="0" err="1"/>
-              <a:t>frames</a:t>
-            </a:r>
-            <a:r>
-              <a:rPr lang="es-ES" dirty="0"/>
-              <a:t> pt1</a:t>
+              <a:t>Data frames pt1</a:t>
             </a:r>
           </a:p>
         </p:txBody>
@@ -13247,23 +13254,19 @@
           <a:p>
             <a:r>
               <a:rPr lang="es-ES" dirty="0"/>
-              <a:t>Con “df1 &lt;- </a:t>
-            </a:r>
-            <a:r>
-              <a:rPr lang="es-ES" dirty="0" err="1"/>
-              <a:t>data.frame</a:t>
+              <a:t>Con </a:t>
+            </a:r>
+            <a:r>
+              <a:rPr lang="es-ES" b="1" dirty="0">
+                <a:solidFill>
+                  <a:schemeClr val="bg1"/>
+                </a:solidFill>
+              </a:rPr>
+              <a:t>“df1 &lt;- data.frame(nombres,edades,estado)” </a:t>
             </a:r>
             <a:r>
               <a:rPr lang="es-ES" dirty="0"/>
-              <a:t>(</a:t>
-            </a:r>
-            <a:r>
-              <a:rPr lang="es-ES" dirty="0" err="1"/>
-              <a:t>nombres,edades,estado</a:t>
-            </a:r>
-            <a:r>
-              <a:rPr lang="es-ES" dirty="0"/>
-              <a:t>)” tenemos el conjunto de datos con sus valores y podemos mostrarlos en forma de tabla.</a:t>
+              <a:t>tenemos el conjunto de datos con sus valores y podemos mostrarlos en forma de tabla.</a:t>
             </a:r>
           </a:p>
         </p:txBody>
@@ -13411,15 +13414,7 @@
           <a:p>
             <a:r>
               <a:rPr lang="es-ES" dirty="0"/>
-              <a:t>Data </a:t>
-            </a:r>
-            <a:r>
-              <a:rPr lang="es-ES" dirty="0" err="1"/>
-              <a:t>frames</a:t>
-            </a:r>
-            <a:r>
-              <a:rPr lang="es-ES" dirty="0"/>
-              <a:t> pt1</a:t>
+              <a:t>Data frames pt1</a:t>
             </a:r>
           </a:p>
         </p:txBody>
@@ -13452,23 +13447,15 @@
           <a:p>
             <a:r>
               <a:rPr lang="es-ES" dirty="0"/>
-              <a:t>Si queremos convertir una matriz en un data </a:t>
-            </a:r>
-            <a:r>
-              <a:rPr lang="es-ES" dirty="0" err="1"/>
-              <a:t>frame</a:t>
-            </a:r>
-            <a:r>
-              <a:rPr lang="es-ES" dirty="0"/>
-              <a:t> “df2 &lt;- </a:t>
-            </a:r>
-            <a:r>
-              <a:rPr lang="es-ES" dirty="0" err="1"/>
-              <a:t>as.data.frame</a:t>
-            </a:r>
-            <a:r>
-              <a:rPr lang="es-ES" dirty="0"/>
-              <a:t>(m1)”</a:t>
+              <a:t>Si queremos convertir una matriz en un data frame </a:t>
+            </a:r>
+            <a:r>
+              <a:rPr lang="es-ES" b="1" dirty="0">
+                <a:solidFill>
+                  <a:schemeClr val="bg1"/>
+                </a:solidFill>
+              </a:rPr>
+              <a:t>“df2 &lt;- as.data.frame(m1)”</a:t>
             </a:r>
           </a:p>
         </p:txBody>
@@ -13576,6 +13563,481 @@
 </p:sld>
 </file>
 
+<file path=ppt/slides/slide17.xml><?xml version="1.0" encoding="utf-8"?>
+<p:sld xmlns:a="http://schemas.openxmlformats.org/drawingml/2006/main" xmlns:r="http://schemas.openxmlformats.org/officeDocument/2006/relationships" xmlns:p="http://schemas.openxmlformats.org/presentationml/2006/main">
+  <p:cSld>
+    <p:spTree>
+      <p:nvGrpSpPr>
+        <p:cNvPr id="1" name=""/>
+        <p:cNvGrpSpPr/>
+        <p:nvPr/>
+      </p:nvGrpSpPr>
+      <p:grpSpPr>
+        <a:xfrm>
+          <a:off x="0" y="0"/>
+          <a:ext cx="0" cy="0"/>
+          <a:chOff x="0" y="0"/>
+          <a:chExt cx="0" cy="0"/>
+        </a:xfrm>
+      </p:grpSpPr>
+      <p:sp>
+        <p:nvSpPr>
+          <p:cNvPr id="2" name="Título 1">
+            <a:extLst>
+              <a:ext uri="{FF2B5EF4-FFF2-40B4-BE49-F238E27FC236}">
+                <a16:creationId xmlns:a16="http://schemas.microsoft.com/office/drawing/2014/main" id="{6765F9F6-6257-4C56-9405-08E336442A68}"/>
+              </a:ext>
+            </a:extLst>
+          </p:cNvPr>
+          <p:cNvSpPr>
+            <a:spLocks noGrp="1"/>
+          </p:cNvSpPr>
+          <p:nvPr>
+            <p:ph type="title"/>
+          </p:nvPr>
+        </p:nvSpPr>
+        <p:spPr/>
+        <p:txBody>
+          <a:bodyPr/>
+          <a:lstStyle/>
+          <a:p>
+            <a:r>
+              <a:rPr lang="es-ES" dirty="0"/>
+              <a:t>Data frames 2</a:t>
+            </a:r>
+          </a:p>
+        </p:txBody>
+      </p:sp>
+      <p:sp>
+        <p:nvSpPr>
+          <p:cNvPr id="3" name="Marcador de contenido 2">
+            <a:extLst>
+              <a:ext uri="{FF2B5EF4-FFF2-40B4-BE49-F238E27FC236}">
+                <a16:creationId xmlns:a16="http://schemas.microsoft.com/office/drawing/2014/main" id="{A92B4410-B877-4D7F-BAA9-1B6522574006}"/>
+              </a:ext>
+            </a:extLst>
+          </p:cNvPr>
+          <p:cNvSpPr>
+            <a:spLocks noGrp="1"/>
+          </p:cNvSpPr>
+          <p:nvPr>
+            <p:ph idx="1"/>
+          </p:nvPr>
+        </p:nvSpPr>
+        <p:spPr>
+          <a:xfrm>
+            <a:off x="6011333" y="1879600"/>
+            <a:ext cx="5036078" cy="3911601"/>
+          </a:xfrm>
+        </p:spPr>
+        <p:txBody>
+          <a:bodyPr/>
+          <a:lstStyle/>
+          <a:p>
+            <a:r>
+              <a:rPr lang="es-ES" dirty="0"/>
+              <a:t>Para seleccionar algún dato de dentro simplemente es poner la fila y columna que queremos. </a:t>
+            </a:r>
+          </a:p>
+          <a:p>
+            <a:r>
+              <a:rPr lang="es-ES" dirty="0"/>
+              <a:t>Por ejemplo si queremos el 15. Seria </a:t>
+            </a:r>
+            <a:r>
+              <a:rPr lang="es-ES" b="1" dirty="0">
+                <a:solidFill>
+                  <a:schemeClr val="bg1"/>
+                </a:solidFill>
+              </a:rPr>
+              <a:t>“df1[2,’edades’]”</a:t>
+            </a:r>
+          </a:p>
+        </p:txBody>
+      </p:sp>
+      <p:pic>
+        <p:nvPicPr>
+          <p:cNvPr id="4" name="Marcador de contenido 3">
+            <a:extLst>
+              <a:ext uri="{FF2B5EF4-FFF2-40B4-BE49-F238E27FC236}">
+                <a16:creationId xmlns:a16="http://schemas.microsoft.com/office/drawing/2014/main" id="{933C10F2-A30B-458C-991C-E1A86DF75956}"/>
+              </a:ext>
+            </a:extLst>
+          </p:cNvPr>
+          <p:cNvPicPr>
+            <a:picLocks noChangeAspect="1"/>
+          </p:cNvPicPr>
+          <p:nvPr/>
+        </p:nvPicPr>
+        <p:blipFill>
+          <a:blip r:embed="rId2"/>
+          <a:stretch>
+            <a:fillRect/>
+          </a:stretch>
+        </p:blipFill>
+        <p:spPr>
+          <a:xfrm>
+            <a:off x="991390" y="2097088"/>
+            <a:ext cx="3839111" cy="1543265"/>
+          </a:xfrm>
+          <a:prstGeom prst="rect">
+            <a:avLst/>
+          </a:prstGeom>
+        </p:spPr>
+      </p:pic>
+    </p:spTree>
+    <p:extLst>
+      <p:ext uri="{BB962C8B-B14F-4D97-AF65-F5344CB8AC3E}">
+        <p14:creationId xmlns:p14="http://schemas.microsoft.com/office/powerpoint/2010/main" val="3108796576"/>
+      </p:ext>
+    </p:extLst>
+  </p:cSld>
+  <p:clrMapOvr>
+    <a:masterClrMapping/>
+  </p:clrMapOvr>
+</p:sld>
+</file>
+
+<file path=ppt/slides/slide18.xml><?xml version="1.0" encoding="utf-8"?>
+<p:sld xmlns:a="http://schemas.openxmlformats.org/drawingml/2006/main" xmlns:r="http://schemas.openxmlformats.org/officeDocument/2006/relationships" xmlns:p="http://schemas.openxmlformats.org/presentationml/2006/main">
+  <p:cSld>
+    <p:spTree>
+      <p:nvGrpSpPr>
+        <p:cNvPr id="1" name=""/>
+        <p:cNvGrpSpPr/>
+        <p:nvPr/>
+      </p:nvGrpSpPr>
+      <p:grpSpPr>
+        <a:xfrm>
+          <a:off x="0" y="0"/>
+          <a:ext cx="0" cy="0"/>
+          <a:chOff x="0" y="0"/>
+          <a:chExt cx="0" cy="0"/>
+        </a:xfrm>
+      </p:grpSpPr>
+      <p:sp>
+        <p:nvSpPr>
+          <p:cNvPr id="2" name="Título 1">
+            <a:extLst>
+              <a:ext uri="{FF2B5EF4-FFF2-40B4-BE49-F238E27FC236}">
+                <a16:creationId xmlns:a16="http://schemas.microsoft.com/office/drawing/2014/main" id="{5D53EA0F-47BE-4B42-B24F-15207BC0CF9F}"/>
+              </a:ext>
+            </a:extLst>
+          </p:cNvPr>
+          <p:cNvSpPr>
+            <a:spLocks noGrp="1"/>
+          </p:cNvSpPr>
+          <p:nvPr>
+            <p:ph type="title"/>
+          </p:nvPr>
+        </p:nvSpPr>
+        <p:spPr/>
+        <p:txBody>
+          <a:bodyPr/>
+          <a:lstStyle/>
+          <a:p>
+            <a:r>
+              <a:rPr lang="es-ES" dirty="0"/>
+              <a:t>Tipos especiales de datos</a:t>
+            </a:r>
+          </a:p>
+        </p:txBody>
+      </p:sp>
+      <p:sp>
+        <p:nvSpPr>
+          <p:cNvPr id="3" name="Marcador de contenido 2">
+            <a:extLst>
+              <a:ext uri="{FF2B5EF4-FFF2-40B4-BE49-F238E27FC236}">
+                <a16:creationId xmlns:a16="http://schemas.microsoft.com/office/drawing/2014/main" id="{A3828386-8D1D-40B4-951C-854C4034A891}"/>
+              </a:ext>
+            </a:extLst>
+          </p:cNvPr>
+          <p:cNvSpPr>
+            <a:spLocks noGrp="1"/>
+          </p:cNvSpPr>
+          <p:nvPr>
+            <p:ph idx="1"/>
+          </p:nvPr>
+        </p:nvSpPr>
+        <p:spPr>
+          <a:xfrm>
+            <a:off x="7611533" y="1828800"/>
+            <a:ext cx="3435878" cy="3962401"/>
+          </a:xfrm>
+        </p:spPr>
+        <p:txBody>
+          <a:bodyPr>
+            <a:normAutofit lnSpcReduction="10000"/>
+          </a:bodyPr>
+          <a:lstStyle/>
+          <a:p>
+            <a:r>
+              <a:rPr lang="es-ES" dirty="0"/>
+              <a:t>Al usar as.factor hacemos que v2 se muestre con características especiales por cada posición que ocupa a diferencia de v1 que solo mostraría los caracteres</a:t>
+            </a:r>
+          </a:p>
+        </p:txBody>
+      </p:sp>
+      <p:pic>
+        <p:nvPicPr>
+          <p:cNvPr id="5" name="Imagen 4">
+            <a:extLst>
+              <a:ext uri="{FF2B5EF4-FFF2-40B4-BE49-F238E27FC236}">
+                <a16:creationId xmlns:a16="http://schemas.microsoft.com/office/drawing/2014/main" id="{15D1B22E-8F1C-4CA0-812C-2EC735B64F8D}"/>
+              </a:ext>
+            </a:extLst>
+          </p:cNvPr>
+          <p:cNvPicPr>
+            <a:picLocks noChangeAspect="1"/>
+          </p:cNvPicPr>
+          <p:nvPr/>
+        </p:nvPicPr>
+        <p:blipFill>
+          <a:blip r:embed="rId2"/>
+          <a:stretch>
+            <a:fillRect/>
+          </a:stretch>
+        </p:blipFill>
+        <p:spPr>
+          <a:xfrm>
+            <a:off x="1141413" y="2000051"/>
+            <a:ext cx="2229161" cy="1428949"/>
+          </a:xfrm>
+          <a:prstGeom prst="rect">
+            <a:avLst/>
+          </a:prstGeom>
+        </p:spPr>
+      </p:pic>
+      <p:pic>
+        <p:nvPicPr>
+          <p:cNvPr id="7" name="Imagen 6">
+            <a:extLst>
+              <a:ext uri="{FF2B5EF4-FFF2-40B4-BE49-F238E27FC236}">
+                <a16:creationId xmlns:a16="http://schemas.microsoft.com/office/drawing/2014/main" id="{8BA42794-4824-450D-B87B-46249900D4AD}"/>
+              </a:ext>
+            </a:extLst>
+          </p:cNvPr>
+          <p:cNvPicPr>
+            <a:picLocks noChangeAspect="1"/>
+          </p:cNvPicPr>
+          <p:nvPr/>
+        </p:nvPicPr>
+        <p:blipFill>
+          <a:blip r:embed="rId3"/>
+          <a:stretch>
+            <a:fillRect/>
+          </a:stretch>
+        </p:blipFill>
+        <p:spPr>
+          <a:xfrm>
+            <a:off x="833567" y="3483991"/>
+            <a:ext cx="5715798" cy="1057423"/>
+          </a:xfrm>
+          <a:prstGeom prst="rect">
+            <a:avLst/>
+          </a:prstGeom>
+        </p:spPr>
+      </p:pic>
+    </p:spTree>
+    <p:extLst>
+      <p:ext uri="{BB962C8B-B14F-4D97-AF65-F5344CB8AC3E}">
+        <p14:creationId xmlns:p14="http://schemas.microsoft.com/office/powerpoint/2010/main" val="3042785578"/>
+      </p:ext>
+    </p:extLst>
+  </p:cSld>
+  <p:clrMapOvr>
+    <a:masterClrMapping/>
+  </p:clrMapOvr>
+</p:sld>
+</file>
+
+<file path=ppt/slides/slide19.xml><?xml version="1.0" encoding="utf-8"?>
+<p:sld xmlns:a="http://schemas.openxmlformats.org/drawingml/2006/main" xmlns:r="http://schemas.openxmlformats.org/officeDocument/2006/relationships" xmlns:p="http://schemas.openxmlformats.org/presentationml/2006/main">
+  <p:cSld>
+    <p:spTree>
+      <p:nvGrpSpPr>
+        <p:cNvPr id="1" name=""/>
+        <p:cNvGrpSpPr/>
+        <p:nvPr/>
+      </p:nvGrpSpPr>
+      <p:grpSpPr>
+        <a:xfrm>
+          <a:off x="0" y="0"/>
+          <a:ext cx="0" cy="0"/>
+          <a:chOff x="0" y="0"/>
+          <a:chExt cx="0" cy="0"/>
+        </a:xfrm>
+      </p:grpSpPr>
+      <p:sp>
+        <p:nvSpPr>
+          <p:cNvPr id="2" name="Título 1">
+            <a:extLst>
+              <a:ext uri="{FF2B5EF4-FFF2-40B4-BE49-F238E27FC236}">
+                <a16:creationId xmlns:a16="http://schemas.microsoft.com/office/drawing/2014/main" id="{ADBD8A86-FD52-44D0-B1E6-66D946526DA9}"/>
+              </a:ext>
+            </a:extLst>
+          </p:cNvPr>
+          <p:cNvSpPr>
+            <a:spLocks noGrp="1"/>
+          </p:cNvSpPr>
+          <p:nvPr>
+            <p:ph type="title"/>
+          </p:nvPr>
+        </p:nvSpPr>
+        <p:spPr/>
+        <p:txBody>
+          <a:bodyPr/>
+          <a:lstStyle/>
+          <a:p>
+            <a:r>
+              <a:rPr lang="es-ES" dirty="0"/>
+              <a:t>Tipos especiales de datos</a:t>
+            </a:r>
+          </a:p>
+        </p:txBody>
+      </p:sp>
+      <p:sp>
+        <p:nvSpPr>
+          <p:cNvPr id="3" name="Marcador de contenido 2">
+            <a:extLst>
+              <a:ext uri="{FF2B5EF4-FFF2-40B4-BE49-F238E27FC236}">
+                <a16:creationId xmlns:a16="http://schemas.microsoft.com/office/drawing/2014/main" id="{5AF99466-0245-4FC8-B218-189F028B800B}"/>
+              </a:ext>
+            </a:extLst>
+          </p:cNvPr>
+          <p:cNvSpPr>
+            <a:spLocks noGrp="1"/>
+          </p:cNvSpPr>
+          <p:nvPr>
+            <p:ph idx="1"/>
+          </p:nvPr>
+        </p:nvSpPr>
+        <p:spPr>
+          <a:xfrm>
+            <a:off x="7391400" y="2249487"/>
+            <a:ext cx="3656011" cy="3541714"/>
+          </a:xfrm>
+        </p:spPr>
+        <p:txBody>
+          <a:bodyPr>
+            <a:normAutofit lnSpcReduction="10000"/>
+          </a:bodyPr>
+          <a:lstStyle/>
+          <a:p>
+            <a:r>
+              <a:rPr lang="es-ES" dirty="0"/>
+              <a:t>Podemos usar datos infinitos con </a:t>
+            </a:r>
+            <a:r>
+              <a:rPr lang="es-ES" b="1" dirty="0">
+                <a:solidFill>
+                  <a:schemeClr val="bg1"/>
+                </a:solidFill>
+              </a:rPr>
+              <a:t>inf</a:t>
+            </a:r>
+            <a:r>
+              <a:rPr lang="es-ES" dirty="0"/>
+              <a:t> y </a:t>
+            </a:r>
+            <a:r>
+              <a:rPr lang="es-ES" b="1" dirty="0">
+                <a:solidFill>
+                  <a:schemeClr val="bg1"/>
+                </a:solidFill>
+              </a:rPr>
+              <a:t>–inf</a:t>
+            </a:r>
+          </a:p>
+          <a:p>
+            <a:r>
+              <a:rPr lang="es-ES" dirty="0"/>
+              <a:t>Si tenemos valores NA dentro de un vector y queremos que nos haga el calculo ignorando NA, tenemos que utilizar </a:t>
+            </a:r>
+            <a:r>
+              <a:rPr lang="es-ES" b="1" dirty="0">
+                <a:solidFill>
+                  <a:schemeClr val="bg1"/>
+                </a:solidFill>
+              </a:rPr>
+              <a:t>“na.rm=TRUE”</a:t>
+            </a:r>
+          </a:p>
+        </p:txBody>
+      </p:sp>
+      <p:pic>
+        <p:nvPicPr>
+          <p:cNvPr id="5" name="Imagen 4">
+            <a:extLst>
+              <a:ext uri="{FF2B5EF4-FFF2-40B4-BE49-F238E27FC236}">
+                <a16:creationId xmlns:a16="http://schemas.microsoft.com/office/drawing/2014/main" id="{37FE8843-291D-4E9E-BF9C-77420D870580}"/>
+              </a:ext>
+            </a:extLst>
+          </p:cNvPr>
+          <p:cNvPicPr>
+            <a:picLocks noChangeAspect="1"/>
+          </p:cNvPicPr>
+          <p:nvPr/>
+        </p:nvPicPr>
+        <p:blipFill>
+          <a:blip r:embed="rId2"/>
+          <a:stretch>
+            <a:fillRect/>
+          </a:stretch>
+        </p:blipFill>
+        <p:spPr>
+          <a:xfrm>
+            <a:off x="2453747" y="1942935"/>
+            <a:ext cx="2133898" cy="2362530"/>
+          </a:xfrm>
+          <a:prstGeom prst="rect">
+            <a:avLst/>
+          </a:prstGeom>
+        </p:spPr>
+      </p:pic>
+      <p:pic>
+        <p:nvPicPr>
+          <p:cNvPr id="7" name="Imagen 6">
+            <a:extLst>
+              <a:ext uri="{FF2B5EF4-FFF2-40B4-BE49-F238E27FC236}">
+                <a16:creationId xmlns:a16="http://schemas.microsoft.com/office/drawing/2014/main" id="{4FDC8656-F178-47E7-B1AC-009C7C68F13D}"/>
+              </a:ext>
+            </a:extLst>
+          </p:cNvPr>
+          <p:cNvPicPr>
+            <a:picLocks noChangeAspect="1"/>
+          </p:cNvPicPr>
+          <p:nvPr/>
+        </p:nvPicPr>
+        <p:blipFill>
+          <a:blip r:embed="rId3"/>
+          <a:stretch>
+            <a:fillRect/>
+          </a:stretch>
+        </p:blipFill>
+        <p:spPr>
+          <a:xfrm>
+            <a:off x="804989" y="4371357"/>
+            <a:ext cx="5772956" cy="1190791"/>
+          </a:xfrm>
+          <a:prstGeom prst="rect">
+            <a:avLst/>
+          </a:prstGeom>
+        </p:spPr>
+      </p:pic>
+    </p:spTree>
+    <p:extLst>
+      <p:ext uri="{BB962C8B-B14F-4D97-AF65-F5344CB8AC3E}">
+        <p14:creationId xmlns:p14="http://schemas.microsoft.com/office/powerpoint/2010/main" val="430589903"/>
+      </p:ext>
+    </p:extLst>
+  </p:cSld>
+  <p:clrMapOvr>
+    <a:masterClrMapping/>
+  </p:clrMapOvr>
+</p:sld>
+</file>
+
 <file path=ppt/slides/slide2.xml><?xml version="1.0" encoding="utf-8"?>
 <p:sld xmlns:a="http://schemas.openxmlformats.org/drawingml/2006/main" xmlns:r="http://schemas.openxmlformats.org/officeDocument/2006/relationships" xmlns:p="http://schemas.openxmlformats.org/presentationml/2006/main">
   <p:cSld>
@@ -13649,25 +14111,13 @@
           <a:p>
             <a:r>
               <a:rPr lang="es-ES" dirty="0"/>
-              <a:t>Como </a:t>
-            </a:r>
-            <a:r>
-              <a:rPr lang="es-ES" dirty="0" err="1"/>
-              <a:t>podeis</a:t>
-            </a:r>
+              <a:t>Como podéis observar empiezo probando cosas básicas. Por ejemplo: Escribimos “hola”, le preguntamos su tipo y es un carácter. </a:t>
+            </a:r>
+          </a:p>
+          <a:p>
             <a:r>
               <a:rPr lang="es-ES" dirty="0"/>
-              <a:t> observar empiezo probando cosas básicas. Por ejemplo: Escribimos “hola”, le preguntamos su tipo y es un carácter. </a:t>
-            </a:r>
-          </a:p>
-          <a:p>
-            <a:r>
-              <a:rPr lang="es-ES" dirty="0" err="1"/>
-              <a:t>Tambien</a:t>
-            </a:r>
-            <a:r>
-              <a:rPr lang="es-ES" dirty="0"/>
-              <a:t> probamos cálculos matemáticos y su clase. Como “5” que es clase numérica.</a:t>
+              <a:t>También probamos cálculos matemáticos y su clase. Como “5” que es clase numérica.</a:t>
             </a:r>
           </a:p>
         </p:txBody>
@@ -13828,15 +14278,19 @@
             </a:pPr>
             <a:r>
               <a:rPr lang="es-ES" dirty="0"/>
-              <a:t>Al aplicar “a &lt;- 7” se nos guarda en </a:t>
-            </a:r>
-            <a:r>
-              <a:rPr lang="es-ES" dirty="0" err="1"/>
-              <a:t>values</a:t>
+              <a:t>Al aplicar </a:t>
+            </a:r>
+            <a:r>
+              <a:rPr lang="es-ES" b="1" dirty="0">
+                <a:solidFill>
+                  <a:schemeClr val="bg1"/>
+                </a:solidFill>
+              </a:rPr>
+              <a:t>“a &lt;- 7” </a:t>
             </a:r>
             <a:r>
               <a:rPr lang="es-ES" dirty="0"/>
-              <a:t>, hacemos el calculo a+7 y como “a” vale 7 de resultado nos devuelve 14. </a:t>
+              <a:t>se nos guarda en values, hacemos el calculo a+7 y como “a” vale 7 de resultado nos devuelve 14. </a:t>
             </a:r>
           </a:p>
           <a:p>
@@ -13845,7 +14299,19 @@
             </a:pPr>
             <a:r>
               <a:rPr lang="es-ES" dirty="0"/>
-              <a:t>Al cambiar “a &lt;-9” se guarda el nuevo valor y pasa lo mismo si escribimos una frase. Es decir no hay exclusividad por lo tanto siempre se va a poder cambiar.</a:t>
+              <a:t>Al cambiar </a:t>
+            </a:r>
+            <a:r>
+              <a:rPr lang="es-ES" b="1" dirty="0">
+                <a:solidFill>
+                  <a:schemeClr val="bg1"/>
+                </a:solidFill>
+              </a:rPr>
+              <a:t>“a &lt;-9” </a:t>
+            </a:r>
+            <a:r>
+              <a:rPr lang="es-ES" dirty="0"/>
+              <a:t>se guarda el nuevo valor y pasa lo mismo si escribimos una frase. Es decir no hay exclusividad por lo tanto siempre se va a poder cambiar.</a:t>
             </a:r>
           </a:p>
         </p:txBody>
@@ -13966,31 +14432,7 @@
           <a:p>
             <a:r>
               <a:rPr lang="es-ES" dirty="0"/>
-              <a:t>Creamos 3 vectores, uno tipo </a:t>
-            </a:r>
-            <a:r>
-              <a:rPr lang="es-ES" dirty="0" err="1"/>
-              <a:t>numerico</a:t>
-            </a:r>
-            <a:r>
-              <a:rPr lang="es-ES" dirty="0"/>
-              <a:t>, </a:t>
-            </a:r>
-            <a:r>
-              <a:rPr lang="es-ES" dirty="0" err="1"/>
-              <a:t>caracter</a:t>
-            </a:r>
-            <a:r>
-              <a:rPr lang="es-ES" dirty="0"/>
-              <a:t>, y lógico. Al preguntar que si son vectores con “</a:t>
-            </a:r>
-            <a:r>
-              <a:rPr lang="es-ES" dirty="0" err="1"/>
-              <a:t>is.vector</a:t>
-            </a:r>
-            <a:r>
-              <a:rPr lang="es-ES" dirty="0"/>
-              <a:t>” como veis nos devuelve TRUE</a:t>
+              <a:t>Creamos 3 vectores, uno tipo numérico, carácter, y lógico. Al preguntar que si son vectores con “carácter” como veis nos devuelve TRUE</a:t>
             </a:r>
           </a:p>
           <a:p>
@@ -14134,7 +14576,7 @@
         </p:nvSpPr>
         <p:spPr>
           <a:xfrm>
-            <a:off x="6006526" y="618518"/>
+            <a:off x="6006525" y="1215598"/>
             <a:ext cx="5389608" cy="5172683"/>
           </a:xfrm>
         </p:spPr>
@@ -14147,7 +14589,11 @@
               <a:t>Podemos combinar vectores, combinamos v1 con v4, </a:t>
             </a:r>
             <a:r>
-              <a:rPr lang="es-ES" b="1" dirty="0"/>
+              <a:rPr lang="es-ES" b="1" dirty="0">
+                <a:solidFill>
+                  <a:schemeClr val="bg1"/>
+                </a:solidFill>
+              </a:rPr>
               <a:t>“v5 &lt;- c(v1,v4)”.</a:t>
             </a:r>
           </a:p>
@@ -14157,18 +14603,14 @@
             </a:pPr>
             <a:r>
               <a:rPr lang="es-ES" dirty="0"/>
-              <a:t>Pero que pasaría si combinamos de dos tipos diferentes? Se combinan pero se quedan con el tipo mas universal es decir se nos han quedado con el tipo carácter, el “1”  y “4” ya no serian numéricos. </a:t>
-            </a:r>
-            <a:r>
-              <a:rPr lang="es-ES" dirty="0" err="1"/>
-              <a:t>Tambien</a:t>
-            </a:r>
-            <a:r>
-              <a:rPr lang="es-ES" dirty="0"/>
-              <a:t> podemos calcular la longitud de nuestro vector con “</a:t>
-            </a:r>
-            <a:r>
-              <a:rPr lang="es-ES" dirty="0" err="1"/>
+              <a:t>Pero que pasaría si combinamos de dos tipos diferentes? Se combinan pero se quedan con el tipo mas universal es decir se nos han quedado con el tipo carácter, el “1”  y “4” ya no serian numéricos. También podemos calcular la longitud de nuestro vector con “</a:t>
+            </a:r>
+            <a:r>
+              <a:rPr lang="es-ES" b="1" dirty="0">
+                <a:solidFill>
+                  <a:schemeClr val="bg1"/>
+                </a:solidFill>
+              </a:rPr>
               <a:t>lenght</a:t>
             </a:r>
             <a:r>
@@ -14330,7 +14772,19 @@
           <a:p>
             <a:r>
               <a:rPr lang="es-ES" dirty="0"/>
-              <a:t>Poniendo “v1[2] &lt;-5” cambiamos el valor que había en la posición 2.</a:t>
+              <a:t>Poniendo </a:t>
+            </a:r>
+            <a:r>
+              <a:rPr lang="es-ES" b="1" dirty="0">
+                <a:solidFill>
+                  <a:schemeClr val="bg1"/>
+                </a:solidFill>
+              </a:rPr>
+              <a:t>“v1[2] &lt;-5” </a:t>
+            </a:r>
+            <a:r>
+              <a:rPr lang="es-ES" dirty="0"/>
+              <a:t>cambiamos el valor que había en la posición 2.</a:t>
             </a:r>
           </a:p>
           <a:p>

</xml_diff>